<commit_message>
Updating my poster a little more with a slightly better active title but its still a work in progress
</commit_message>
<xml_diff>
--- a/Presentation/bbm_SA_MGE.pptx
+++ b/Presentation/bbm_SA_MGE.pptx
@@ -4504,22 +4504,7 @@
                 <a:latin typeface="Arial" panose="020B0604020202020204" pitchFamily="34" charset="0"/>
                 <a:cs typeface="Arial" panose="020B0604020202020204" pitchFamily="34" charset="0"/>
               </a:rPr>
-              <a:t>PHYLOGENETIC PHAGE ENCODED GENE </a:t>
-            </a:r>
-          </a:p>
-          <a:p>
-            <a:pPr algn="ctr">
-              <a:buClr>
-                <a:schemeClr val="lt1"/>
-              </a:buClr>
-              <a:buSzPts val="3600"/>
-            </a:pPr>
-            <a:r>
-              <a:rPr lang="en-US" sz="4800" b="1" dirty="0">
-                <a:latin typeface="Arial" panose="020B0604020202020204" pitchFamily="34" charset="0"/>
-                <a:cs typeface="Arial" panose="020B0604020202020204" pitchFamily="34" charset="0"/>
-              </a:rPr>
-              <a:t>ABUNDANCE</a:t>
+              <a:t>PHAGE-ENCODED GENES ARE UBITQUITOUSLY FOUND ON THE PHYLOGENY TREE</a:t>
             </a:r>
             <a:endParaRPr lang="en-US" sz="4800" dirty="0">
               <a:latin typeface="Arial" panose="020B0604020202020204" pitchFamily="34" charset="0"/>
@@ -4572,8 +4557,19 @@
                 <a:latin typeface="Arial" panose="020B0604020202020204" pitchFamily="34" charset="0"/>
                 <a:cs typeface="Arial" panose="020B0604020202020204" pitchFamily="34" charset="0"/>
               </a:rPr>
-              <a:t>I am thinking of a more active title but I just wanted to lay out my poster !!</a:t>
-            </a:r>
+              <a:t>I am thinking of a more active title but I just wanted to lay out my poster !! Its really rough but I am </a:t>
+            </a:r>
+            <a:r>
+              <a:rPr lang="en-US" sz="3600" b="1">
+                <a:latin typeface="Arial" panose="020B0604020202020204" pitchFamily="34" charset="0"/>
+                <a:cs typeface="Arial" panose="020B0604020202020204" pitchFamily="34" charset="0"/>
+              </a:rPr>
+              <a:t>still thinking!!</a:t>
+            </a:r>
+            <a:endParaRPr lang="en-US" sz="3600" b="1" dirty="0">
+              <a:latin typeface="Arial" panose="020B0604020202020204" pitchFamily="34" charset="0"/>
+              <a:cs typeface="Arial" panose="020B0604020202020204" pitchFamily="34" charset="0"/>
+            </a:endParaRPr>
           </a:p>
         </p:txBody>
       </p:sp>

</xml_diff>